<commit_message>
got API get request to work, working on getting cards from API to show up properly
</commit_message>
<xml_diff>
--- a/InspirationBoardFlowChart.pptx
+++ b/InspirationBoardFlowChart.pptx
@@ -3356,7 +3356,7 @@
           <a:p>
             <a:r>
               <a:rPr lang="en-US" dirty="0"/>
-              <a:t>App (functional component)</a:t>
+              <a:t>App (class component)</a:t>
             </a:r>
           </a:p>
         </p:txBody>
@@ -3376,7 +3376,7 @@
         <p:spPr>
           <a:xfrm>
             <a:off x="3568921" y="1411584"/>
-            <a:ext cx="4679804" cy="3108543"/>
+            <a:ext cx="4679804" cy="2893100"/>
           </a:xfrm>
           <a:prstGeom prst="rect">
             <a:avLst/>
@@ -3402,35 +3402,17 @@
           <a:p>
             <a:r>
               <a:rPr lang="en-US" sz="1400" dirty="0"/>
-              <a:t>recentPoem</a:t>
+              <a:t>cards=[]</a:t>
             </a:r>
           </a:p>
           <a:p>
             <a:r>
               <a:rPr lang="en-US" sz="1400" dirty="0"/>
-              <a:t>poemTotal </a:t>
-            </a:r>
-          </a:p>
-          <a:p>
-            <a:r>
-              <a:rPr lang="en-US" sz="1400" dirty="0"/>
-              <a:t>finalDisplay: starts false}</a:t>
+              <a:t>}</a:t>
             </a:r>
           </a:p>
           <a:p>
             <a:endParaRPr lang="en-US" sz="1400" dirty="0"/>
-          </a:p>
-          <a:p>
-            <a:r>
-              <a:rPr lang="en-US" sz="1400" dirty="0"/>
-              <a:t>&lt;PlayerSubmissionForm</a:t>
-            </a:r>
-          </a:p>
-          <a:p>
-            <a:r>
-              <a:rPr lang="en-US" sz="1400" dirty="0"/>
-              <a:t>{onSubmitPoemCallback={this.onSubmitPoem}/&gt;</a:t>
-            </a:r>
           </a:p>
           <a:p>
             <a:r>
@@ -3439,18 +3421,22 @@
             </a:r>
             <a:r>
               <a:rPr lang="en-US" sz="1400" dirty="0" err="1"/>
-              <a:t>FinalPoem</a:t>
+              <a:t>NewCardForm</a:t>
             </a:r>
             <a:endParaRPr lang="en-US" sz="1400" dirty="0"/>
           </a:p>
           <a:p>
             <a:r>
+              <a:rPr lang="en-US" sz="1400" dirty="0" err="1"/>
+              <a:t>addCardCallback</a:t>
+            </a:r>
+            <a:r>
               <a:rPr lang="en-US" sz="1400" dirty="0"/>
-              <a:t>{onFinalPoemCallback={</a:t>
+              <a:t>={</a:t>
             </a:r>
             <a:r>
               <a:rPr lang="en-US" sz="1400" dirty="0" err="1"/>
-              <a:t>this.onFinalPoem</a:t>
+              <a:t>this.addCard</a:t>
             </a:r>
             <a:r>
               <a:rPr lang="en-US" sz="1400" dirty="0"/>
@@ -3463,19 +3449,45 @@
           <a:p>
             <a:r>
               <a:rPr lang="en-US" sz="1400" dirty="0"/>
-              <a:t>Callback functions:</a:t>
-            </a:r>
-          </a:p>
-          <a:p>
+              <a:t>Functions:</a:t>
+            </a:r>
+          </a:p>
+          <a:p>
+            <a:r>
+              <a:rPr lang="en-US" sz="1400" dirty="0" err="1"/>
+              <a:t>componentDidMount</a:t>
+            </a:r>
             <a:r>
               <a:rPr lang="en-US" sz="1400" dirty="0"/>
-              <a:t>onSubmitPoem (will take form data and update poemTotal and recentPoem state)</a:t>
-            </a:r>
-          </a:p>
-          <a:p>
+              <a:t> (will call API for cards[])</a:t>
+            </a:r>
+          </a:p>
+          <a:p>
+            <a:r>
+              <a:rPr lang="en-US" sz="1400" dirty="0" err="1"/>
+              <a:t>addCard</a:t>
+            </a:r>
             <a:r>
               <a:rPr lang="en-US" sz="1400" dirty="0"/>
-              <a:t>onFinalPoem (will change finalDisplay state)</a:t>
+              <a:t> (will take form data, make post request and also update card array)</a:t>
+            </a:r>
+          </a:p>
+          <a:p>
+            <a:r>
+              <a:rPr lang="en-US" sz="1400" dirty="0" err="1"/>
+              <a:t>deleteCard</a:t>
+            </a:r>
+            <a:r>
+              <a:rPr lang="en-US" sz="1400" dirty="0"/>
+              <a:t> (will take in </a:t>
+            </a:r>
+            <a:r>
+              <a:rPr lang="en-US" sz="1400" dirty="0" err="1"/>
+              <a:t>cardID</a:t>
+            </a:r>
+            <a:r>
+              <a:rPr lang="en-US" sz="1400" dirty="0"/>
+              <a:t> and make delete request, update cards array)</a:t>
             </a:r>
           </a:p>
         </p:txBody>
@@ -3510,7 +3522,7 @@
           <a:p>
             <a:r>
               <a:rPr lang="en-US" dirty="0"/>
-              <a:t>Game (class component)</a:t>
+              <a:t>Board (class component)</a:t>
             </a:r>
           </a:p>
         </p:txBody>
@@ -3529,8 +3541,8 @@
         </p:nvSpPr>
         <p:spPr>
           <a:xfrm>
-            <a:off x="2037293" y="5187861"/>
-            <a:ext cx="1970468" cy="1600438"/>
+            <a:off x="734357" y="4998503"/>
+            <a:ext cx="3467754" cy="1384995"/>
           </a:xfrm>
           <a:prstGeom prst="rect">
             <a:avLst/>
@@ -3556,7 +3568,23 @@
           <a:p>
             <a:r>
               <a:rPr lang="en-US" sz="1400" dirty="0"/>
-              <a:t>recentPoem</a:t>
+              <a:t>string:</a:t>
+            </a:r>
+          </a:p>
+          <a:p>
+            <a:r>
+              <a:rPr lang="en-US" sz="1400" dirty="0"/>
+              <a:t>emoji:</a:t>
+            </a:r>
+          </a:p>
+          <a:p>
+            <a:r>
+              <a:rPr lang="en-US" sz="1400" dirty="0" err="1"/>
+              <a:t>cardID</a:t>
+            </a:r>
+            <a:r>
+              <a:rPr lang="en-US" sz="1400" dirty="0"/>
+              <a:t>:</a:t>
             </a:r>
           </a:p>
           <a:p>
@@ -3564,9 +3592,10 @@
           </a:p>
           <a:p>
             <a:r>
-              <a:rPr lang="en-US" sz="1400" dirty="0"/>
-              <a:t>(ensure onSubmitPoemCallback changes recent poem display)</a:t>
-            </a:r>
+              <a:rPr lang="en-US" sz="1400" dirty="0" err="1"/>
+              <a:t>this.props.onDeleteCardCallback</a:t>
+            </a:r>
+            <a:endParaRPr lang="en-US" sz="1400" dirty="0"/>
           </a:p>
         </p:txBody>
       </p:sp>
@@ -3584,8 +3613,8 @@
         </p:nvSpPr>
         <p:spPr>
           <a:xfrm>
-            <a:off x="2154785" y="4818529"/>
-            <a:ext cx="1938352" cy="369332"/>
+            <a:off x="1601729" y="4651102"/>
+            <a:ext cx="2491408" cy="369332"/>
           </a:xfrm>
           <a:prstGeom prst="rect">
             <a:avLst/>
@@ -3600,7 +3629,7 @@
           <a:p>
             <a:r>
               <a:rPr lang="en-US" dirty="0"/>
-              <a:t>Recent Submission</a:t>
+              <a:t>Card (class? component)</a:t>
             </a:r>
           </a:p>
         </p:txBody>
@@ -3620,7 +3649,7 @@
         <p:spPr>
           <a:xfrm>
             <a:off x="4311085" y="4736893"/>
-            <a:ext cx="2491408" cy="646331"/>
+            <a:ext cx="3467754" cy="369332"/>
           </a:xfrm>
           <a:prstGeom prst="rect">
             <a:avLst/>
@@ -3635,17 +3664,17 @@
           <a:p>
             <a:r>
               <a:rPr lang="en-US" dirty="0"/>
-              <a:t>Player Submission Form (class component)</a:t>
-            </a:r>
-          </a:p>
-        </p:txBody>
-      </p:sp>
-      <p:sp>
-        <p:nvSpPr>
-          <p:cNvPr id="23" name="TextBox 22">
-            <a:extLst>
-              <a:ext uri="{FF2B5EF4-FFF2-40B4-BE49-F238E27FC236}">
-                <a16:creationId xmlns:a16="http://schemas.microsoft.com/office/drawing/2014/main" id="{4A817039-4A3D-244E-A2C0-73C6B993856F}"/>
+              <a:t>New Card Form (class component)</a:t>
+            </a:r>
+          </a:p>
+        </p:txBody>
+      </p:sp>
+      <p:sp>
+        <p:nvSpPr>
+          <p:cNvPr id="26" name="TextBox 25">
+            <a:extLst>
+              <a:ext uri="{FF2B5EF4-FFF2-40B4-BE49-F238E27FC236}">
+                <a16:creationId xmlns:a16="http://schemas.microsoft.com/office/drawing/2014/main" id="{A4103BEE-8D4B-A546-A64E-08DBC7E8394B}"/>
               </a:ext>
             </a:extLst>
           </p:cNvPr>
@@ -3654,43 +3683,8 @@
         </p:nvSpPr>
         <p:spPr>
           <a:xfrm>
-            <a:off x="7105817" y="5142614"/>
-            <a:ext cx="3312433" cy="369332"/>
-          </a:xfrm>
-          <a:prstGeom prst="rect">
-            <a:avLst/>
-          </a:prstGeom>
-          <a:noFill/>
-        </p:spPr>
-        <p:txBody>
-          <a:bodyPr wrap="square" rtlCol="0">
-            <a:spAutoFit/>
-          </a:bodyPr>
-          <a:lstStyle/>
-          <a:p>
-            <a:r>
-              <a:rPr lang="en-US" dirty="0"/>
-              <a:t>Final Poem(function component)</a:t>
-            </a:r>
-          </a:p>
-        </p:txBody>
-      </p:sp>
-      <p:sp>
-        <p:nvSpPr>
-          <p:cNvPr id="26" name="TextBox 25">
-            <a:extLst>
-              <a:ext uri="{FF2B5EF4-FFF2-40B4-BE49-F238E27FC236}">
-                <a16:creationId xmlns:a16="http://schemas.microsoft.com/office/drawing/2014/main" id="{A4103BEE-8D4B-A546-A64E-08DBC7E8394B}"/>
-              </a:ext>
-            </a:extLst>
-          </p:cNvPr>
-          <p:cNvSpPr txBox="1"/>
-          <p:nvPr/>
-        </p:nvSpPr>
-        <p:spPr>
-          <a:xfrm>
-            <a:off x="4424654" y="5386957"/>
-            <a:ext cx="2491407" cy="1384995"/>
+            <a:off x="4424654" y="5106225"/>
+            <a:ext cx="2993577" cy="1384995"/>
           </a:xfrm>
           <a:prstGeom prst="rect">
             <a:avLst/>
@@ -3716,7 +3710,13 @@
           <a:p>
             <a:r>
               <a:rPr lang="en-US" sz="1400" dirty="0"/>
-              <a:t>All entries</a:t>
+              <a:t>string:’’</a:t>
+            </a:r>
+          </a:p>
+          <a:p>
+            <a:r>
+              <a:rPr lang="en-US" sz="1400" dirty="0"/>
+              <a:t>emoji: ‘’</a:t>
             </a:r>
           </a:p>
           <a:p>
@@ -3730,18 +3730,38 @@
           </a:p>
           <a:p>
             <a:r>
+              <a:rPr lang="en-US" sz="1400" dirty="0" err="1"/>
+              <a:t>this.props</a:t>
+            </a:r>
+            <a:r>
               <a:rPr lang="en-US" sz="1400" dirty="0"/>
-              <a:t>This.props.onSubmitPoemCallback(poemdata)</a:t>
-            </a:r>
-          </a:p>
-        </p:txBody>
-      </p:sp>
-      <p:sp>
-        <p:nvSpPr>
-          <p:cNvPr id="27" name="TextBox 26">
-            <a:extLst>
-              <a:ext uri="{FF2B5EF4-FFF2-40B4-BE49-F238E27FC236}">
-                <a16:creationId xmlns:a16="http://schemas.microsoft.com/office/drawing/2014/main" id="{6198FA59-5341-4D48-837B-1B41496310D1}"/>
+              <a:t>. </a:t>
+            </a:r>
+            <a:r>
+              <a:rPr lang="en-US" sz="1400" dirty="0" err="1"/>
+              <a:t>addCardCallback</a:t>
+            </a:r>
+            <a:r>
+              <a:rPr lang="en-US" sz="1400" dirty="0"/>
+              <a:t>(</a:t>
+            </a:r>
+            <a:r>
+              <a:rPr lang="en-US" sz="1400" dirty="0" err="1"/>
+              <a:t>carddata</a:t>
+            </a:r>
+            <a:r>
+              <a:rPr lang="en-US" sz="1400" dirty="0"/>
+              <a:t>)</a:t>
+            </a:r>
+          </a:p>
+        </p:txBody>
+      </p:sp>
+      <p:sp>
+        <p:nvSpPr>
+          <p:cNvPr id="49" name="TextBox 48">
+            <a:extLst>
+              <a:ext uri="{FF2B5EF4-FFF2-40B4-BE49-F238E27FC236}">
+                <a16:creationId xmlns:a16="http://schemas.microsoft.com/office/drawing/2014/main" id="{F8DCF8D3-6210-F54F-8259-B744696EB7AD}"/>
               </a:ext>
             </a:extLst>
           </p:cNvPr>
@@ -3750,8 +3770,8 @@
         </p:nvSpPr>
         <p:spPr>
           <a:xfrm>
-            <a:off x="7573677" y="5533282"/>
-            <a:ext cx="1970468" cy="954107"/>
+            <a:off x="4742075" y="417251"/>
+            <a:ext cx="1970468" cy="646331"/>
           </a:xfrm>
           <a:prstGeom prst="rect">
             <a:avLst/>
@@ -3770,60 +3790,32 @@
           <a:lstStyle/>
           <a:p>
             <a:r>
-              <a:rPr lang="en-US" sz="1400" dirty="0"/>
-              <a:t>Props:</a:t>
-            </a:r>
-          </a:p>
-          <a:p>
-            <a:r>
-              <a:rPr lang="en-US" sz="1400" dirty="0"/>
-              <a:t>poemTotal</a:t>
-            </a:r>
-          </a:p>
-          <a:p>
-            <a:r>
-              <a:rPr lang="en-US" sz="1400" dirty="0"/>
-              <a:t>this.props.onFinalPoemCallback</a:t>
-            </a:r>
-          </a:p>
-        </p:txBody>
-      </p:sp>
-      <p:sp>
-        <p:nvSpPr>
-          <p:cNvPr id="49" name="TextBox 48">
-            <a:extLst>
-              <a:ext uri="{FF2B5EF4-FFF2-40B4-BE49-F238E27FC236}">
-                <a16:creationId xmlns:a16="http://schemas.microsoft.com/office/drawing/2014/main" id="{F8DCF8D3-6210-F54F-8259-B744696EB7AD}"/>
-              </a:ext>
-            </a:extLst>
-          </p:cNvPr>
-          <p:cNvSpPr txBox="1"/>
-          <p:nvPr/>
-        </p:nvSpPr>
-        <p:spPr>
-          <a:xfrm>
-            <a:off x="4742075" y="417251"/>
-            <a:ext cx="1970468" cy="276999"/>
-          </a:xfrm>
-          <a:prstGeom prst="rect">
-            <a:avLst/>
-          </a:prstGeom>
-          <a:noFill/>
-          <a:ln>
-            <a:solidFill>
-              <a:schemeClr val="accent1"/>
-            </a:solidFill>
-          </a:ln>
-        </p:spPr>
-        <p:txBody>
-          <a:bodyPr wrap="square" rtlCol="0">
-            <a:spAutoFit/>
-          </a:bodyPr>
-          <a:lstStyle/>
-          <a:p>
-            <a:r>
               <a:rPr lang="en-US" sz="1200" dirty="0"/>
-              <a:t>&lt;Game/&gt;</a:t>
+              <a:t>&lt;Board</a:t>
+            </a:r>
+          </a:p>
+          <a:p>
+            <a:r>
+              <a:rPr lang="en-US" sz="1200" dirty="0" err="1"/>
+              <a:t>url</a:t>
+            </a:r>
+            <a:r>
+              <a:rPr lang="en-US" sz="1200" dirty="0"/>
+              <a:t>={}</a:t>
+            </a:r>
+          </a:p>
+          <a:p>
+            <a:r>
+              <a:rPr lang="en-US" sz="1200" dirty="0"/>
+              <a:t>board-name={‘</a:t>
+            </a:r>
+            <a:r>
+              <a:rPr lang="en-US" sz="1200" dirty="0" err="1"/>
+              <a:t>farah</a:t>
+            </a:r>
+            <a:r>
+              <a:rPr lang="en-US" sz="1200" dirty="0"/>
+              <a:t>’}/&gt;</a:t>
             </a:r>
           </a:p>
         </p:txBody>

</xml_diff>